<commit_message>
Prep for Modeling Team Meeting
</commit_message>
<xml_diff>
--- a/2023 North Pacific SWO assessment.pptx
+++ b/2023 North Pacific SWO assessment.pptx
@@ -8,6 +8,14 @@
     <p:sldId id="256" r:id="rId2"/>
     <p:sldId id="257" r:id="rId3"/>
     <p:sldId id="258" r:id="rId4"/>
+    <p:sldId id="259" r:id="rId5"/>
+    <p:sldId id="263" r:id="rId6"/>
+    <p:sldId id="265" r:id="rId7"/>
+    <p:sldId id="264" r:id="rId8"/>
+    <p:sldId id="266" r:id="rId9"/>
+    <p:sldId id="260" r:id="rId10"/>
+    <p:sldId id="261" r:id="rId11"/>
+    <p:sldId id="262" r:id="rId12"/>
   </p:sldIdLst>
   <p:sldSz cx="12192000" cy="6858000"/>
   <p:notesSz cx="6858000" cy="9144000"/>
@@ -106,6 +114,11 @@
       </a:defRPr>
     </a:lvl9pPr>
   </p:defaultTextStyle>
+  <p:extLst>
+    <p:ext uri="{EFAFB233-063F-42B5-8137-9DF3F51BA10A}">
+      <p15:sldGuideLst xmlns:p15="http://schemas.microsoft.com/office/powerpoint/2012/main"/>
+    </p:ext>
+  </p:extLst>
 </p:presentation>
 </file>
 
@@ -240,7 +253,7 @@
           <a:p>
             <a:fld id="{D3DF7DFC-9043-414D-BAE4-905631BA1009}" type="datetimeFigureOut">
               <a:rPr lang="en-US" smtClean="0"/>
-              <a:t>1/17/2023</a:t>
+              <a:t>2/21/2023</a:t>
             </a:fld>
             <a:endParaRPr lang="en-US"/>
           </a:p>
@@ -410,7 +423,7 @@
           <a:p>
             <a:fld id="{D3DF7DFC-9043-414D-BAE4-905631BA1009}" type="datetimeFigureOut">
               <a:rPr lang="en-US" smtClean="0"/>
-              <a:t>1/17/2023</a:t>
+              <a:t>2/21/2023</a:t>
             </a:fld>
             <a:endParaRPr lang="en-US"/>
           </a:p>
@@ -590,7 +603,7 @@
           <a:p>
             <a:fld id="{D3DF7DFC-9043-414D-BAE4-905631BA1009}" type="datetimeFigureOut">
               <a:rPr lang="en-US" smtClean="0"/>
-              <a:t>1/17/2023</a:t>
+              <a:t>2/21/2023</a:t>
             </a:fld>
             <a:endParaRPr lang="en-US"/>
           </a:p>
@@ -760,7 +773,7 @@
           <a:p>
             <a:fld id="{D3DF7DFC-9043-414D-BAE4-905631BA1009}" type="datetimeFigureOut">
               <a:rPr lang="en-US" smtClean="0"/>
-              <a:t>1/17/2023</a:t>
+              <a:t>2/21/2023</a:t>
             </a:fld>
             <a:endParaRPr lang="en-US"/>
           </a:p>
@@ -1006,7 +1019,7 @@
           <a:p>
             <a:fld id="{D3DF7DFC-9043-414D-BAE4-905631BA1009}" type="datetimeFigureOut">
               <a:rPr lang="en-US" smtClean="0"/>
-              <a:t>1/17/2023</a:t>
+              <a:t>2/21/2023</a:t>
             </a:fld>
             <a:endParaRPr lang="en-US"/>
           </a:p>
@@ -1238,7 +1251,7 @@
           <a:p>
             <a:fld id="{D3DF7DFC-9043-414D-BAE4-905631BA1009}" type="datetimeFigureOut">
               <a:rPr lang="en-US" smtClean="0"/>
-              <a:t>1/17/2023</a:t>
+              <a:t>2/21/2023</a:t>
             </a:fld>
             <a:endParaRPr lang="en-US"/>
           </a:p>
@@ -1605,7 +1618,7 @@
           <a:p>
             <a:fld id="{D3DF7DFC-9043-414D-BAE4-905631BA1009}" type="datetimeFigureOut">
               <a:rPr lang="en-US" smtClean="0"/>
-              <a:t>1/17/2023</a:t>
+              <a:t>2/21/2023</a:t>
             </a:fld>
             <a:endParaRPr lang="en-US"/>
           </a:p>
@@ -1723,7 +1736,7 @@
           <a:p>
             <a:fld id="{D3DF7DFC-9043-414D-BAE4-905631BA1009}" type="datetimeFigureOut">
               <a:rPr lang="en-US" smtClean="0"/>
-              <a:t>1/17/2023</a:t>
+              <a:t>2/21/2023</a:t>
             </a:fld>
             <a:endParaRPr lang="en-US"/>
           </a:p>
@@ -1818,7 +1831,7 @@
           <a:p>
             <a:fld id="{D3DF7DFC-9043-414D-BAE4-905631BA1009}" type="datetimeFigureOut">
               <a:rPr lang="en-US" smtClean="0"/>
-              <a:t>1/17/2023</a:t>
+              <a:t>2/21/2023</a:t>
             </a:fld>
             <a:endParaRPr lang="en-US"/>
           </a:p>
@@ -2095,7 +2108,7 @@
           <a:p>
             <a:fld id="{D3DF7DFC-9043-414D-BAE4-905631BA1009}" type="datetimeFigureOut">
               <a:rPr lang="en-US" smtClean="0"/>
-              <a:t>1/17/2023</a:t>
+              <a:t>2/21/2023</a:t>
             </a:fld>
             <a:endParaRPr lang="en-US"/>
           </a:p>
@@ -2348,7 +2361,7 @@
           <a:p>
             <a:fld id="{D3DF7DFC-9043-414D-BAE4-905631BA1009}" type="datetimeFigureOut">
               <a:rPr lang="en-US" smtClean="0"/>
-              <a:t>1/17/2023</a:t>
+              <a:t>2/21/2023</a:t>
             </a:fld>
             <a:endParaRPr lang="en-US"/>
           </a:p>
@@ -2561,7 +2574,7 @@
           <a:p>
             <a:fld id="{D3DF7DFC-9043-414D-BAE4-905631BA1009}" type="datetimeFigureOut">
               <a:rPr lang="en-US" smtClean="0"/>
-              <a:t>1/17/2023</a:t>
+              <a:t>2/21/2023</a:t>
             </a:fld>
             <a:endParaRPr lang="en-US"/>
           </a:p>
@@ -3031,6 +3044,174 @@
 </p:sld>
 </file>
 
+<file path=ppt/slides/slide10.xml><?xml version="1.0" encoding="utf-8"?>
+<p:sld xmlns:a="http://schemas.openxmlformats.org/drawingml/2006/main" xmlns:r="http://schemas.openxmlformats.org/officeDocument/2006/relationships" xmlns:p="http://schemas.openxmlformats.org/presentationml/2006/main">
+  <p:cSld>
+    <p:spTree>
+      <p:nvGrpSpPr>
+        <p:cNvPr id="1" name=""/>
+        <p:cNvGrpSpPr/>
+        <p:nvPr/>
+      </p:nvGrpSpPr>
+      <p:grpSpPr>
+        <a:xfrm>
+          <a:off x="0" y="0"/>
+          <a:ext cx="0" cy="0"/>
+          <a:chOff x="0" y="0"/>
+          <a:chExt cx="0" cy="0"/>
+        </a:xfrm>
+      </p:grpSpPr>
+      <p:pic>
+        <p:nvPicPr>
+          <p:cNvPr id="6" name="Picture 5"/>
+          <p:cNvPicPr>
+            <a:picLocks noChangeAspect="1"/>
+          </p:cNvPicPr>
+          <p:nvPr/>
+        </p:nvPicPr>
+        <p:blipFill>
+          <a:blip r:embed="rId2"/>
+          <a:stretch>
+            <a:fillRect/>
+          </a:stretch>
+        </p:blipFill>
+        <p:spPr>
+          <a:xfrm>
+            <a:off x="1067156" y="262832"/>
+            <a:ext cx="10029132" cy="4280999"/>
+          </a:xfrm>
+          <a:prstGeom prst="rect">
+            <a:avLst/>
+          </a:prstGeom>
+        </p:spPr>
+      </p:pic>
+    </p:spTree>
+    <p:extLst>
+      <p:ext uri="{BB962C8B-B14F-4D97-AF65-F5344CB8AC3E}">
+        <p14:creationId xmlns:p14="http://schemas.microsoft.com/office/powerpoint/2010/main" val="3140265196"/>
+      </p:ext>
+    </p:extLst>
+  </p:cSld>
+  <p:clrMapOvr>
+    <a:masterClrMapping/>
+  </p:clrMapOvr>
+</p:sld>
+</file>
+
+<file path=ppt/slides/slide11.xml><?xml version="1.0" encoding="utf-8"?>
+<p:sld xmlns:a="http://schemas.openxmlformats.org/drawingml/2006/main" xmlns:r="http://schemas.openxmlformats.org/officeDocument/2006/relationships" xmlns:p="http://schemas.openxmlformats.org/presentationml/2006/main">
+  <p:cSld>
+    <p:spTree>
+      <p:nvGrpSpPr>
+        <p:cNvPr id="1" name=""/>
+        <p:cNvGrpSpPr/>
+        <p:nvPr/>
+      </p:nvGrpSpPr>
+      <p:grpSpPr>
+        <a:xfrm>
+          <a:off x="0" y="0"/>
+          <a:ext cx="0" cy="0"/>
+          <a:chOff x="0" y="0"/>
+          <a:chExt cx="0" cy="0"/>
+        </a:xfrm>
+      </p:grpSpPr>
+      <p:pic>
+        <p:nvPicPr>
+          <p:cNvPr id="5" name="Picture 4"/>
+          <p:cNvPicPr>
+            <a:picLocks noChangeAspect="1"/>
+          </p:cNvPicPr>
+          <p:nvPr/>
+        </p:nvPicPr>
+        <p:blipFill>
+          <a:blip r:embed="rId2"/>
+          <a:stretch>
+            <a:fillRect/>
+          </a:stretch>
+        </p:blipFill>
+        <p:spPr>
+          <a:xfrm>
+            <a:off x="1064029" y="132801"/>
+            <a:ext cx="9469692" cy="4948302"/>
+          </a:xfrm>
+          <a:prstGeom prst="rect">
+            <a:avLst/>
+          </a:prstGeom>
+        </p:spPr>
+      </p:pic>
+      <p:sp>
+        <p:nvSpPr>
+          <p:cNvPr id="6" name="TextBox 5"/>
+          <p:cNvSpPr txBox="1"/>
+          <p:nvPr/>
+        </p:nvSpPr>
+        <p:spPr>
+          <a:xfrm>
+            <a:off x="1288473" y="5311833"/>
+            <a:ext cx="9069185" cy="1477328"/>
+          </a:xfrm>
+          <a:prstGeom prst="rect">
+            <a:avLst/>
+          </a:prstGeom>
+          <a:noFill/>
+        </p:spPr>
+        <p:txBody>
+          <a:bodyPr wrap="square" rtlCol="0">
+            <a:spAutoFit/>
+          </a:bodyPr>
+          <a:lstStyle/>
+          <a:p>
+            <a:r>
+              <a:rPr lang="en-US" dirty="0" smtClean="0"/>
+              <a:t>TWN DWLL and US HI LL Deep driving the size comp</a:t>
+            </a:r>
+          </a:p>
+          <a:p>
+            <a:r>
+              <a:rPr lang="en-US" dirty="0"/>
+              <a:t>	</a:t>
+            </a:r>
+            <a:r>
+              <a:rPr lang="en-US" dirty="0" smtClean="0"/>
+              <a:t>Considering dropping/</a:t>
+            </a:r>
+            <a:r>
+              <a:rPr lang="en-US" dirty="0" err="1" smtClean="0"/>
+              <a:t>downweighting</a:t>
+            </a:r>
+            <a:r>
+              <a:rPr lang="en-US" dirty="0" smtClean="0"/>
+              <a:t> US deep</a:t>
+            </a:r>
+          </a:p>
+          <a:p>
+            <a:r>
+              <a:rPr lang="en-US" dirty="0" smtClean="0"/>
+              <a:t>JPN LL Area 1 Late, IATTC, JPN LL Area 1 early, and US HI Shallow early all have very large ln(R0) – could be responsible for the model’s tendency to go to unrealistic population sizes</a:t>
+            </a:r>
+          </a:p>
+          <a:p>
+            <a:r>
+              <a:rPr lang="en-US" dirty="0" smtClean="0"/>
+              <a:t>2018 assessment only included F1-F4, dropped all others</a:t>
+            </a:r>
+            <a:endParaRPr lang="en-US" dirty="0"/>
+          </a:p>
+        </p:txBody>
+      </p:sp>
+    </p:spTree>
+    <p:extLst>
+      <p:ext uri="{BB962C8B-B14F-4D97-AF65-F5344CB8AC3E}">
+        <p14:creationId xmlns:p14="http://schemas.microsoft.com/office/powerpoint/2010/main" val="2369599766"/>
+      </p:ext>
+    </p:extLst>
+  </p:cSld>
+  <p:clrMapOvr>
+    <a:masterClrMapping/>
+  </p:clrMapOvr>
+</p:sld>
+</file>
+
 <file path=ppt/slides/slide2.xml><?xml version="1.0" encoding="utf-8"?>
 <p:sld xmlns:a="http://schemas.openxmlformats.org/drawingml/2006/main" xmlns:r="http://schemas.openxmlformats.org/officeDocument/2006/relationships" xmlns:p="http://schemas.openxmlformats.org/presentationml/2006/main">
   <p:cSld>
@@ -3296,6 +3477,1237 @@
     <p:extLst>
       <p:ext uri="{BB962C8B-B14F-4D97-AF65-F5344CB8AC3E}">
         <p14:creationId xmlns:p14="http://schemas.microsoft.com/office/powerpoint/2010/main" val="2668926101"/>
+      </p:ext>
+    </p:extLst>
+  </p:cSld>
+  <p:clrMapOvr>
+    <a:masterClrMapping/>
+  </p:clrMapOvr>
+</p:sld>
+</file>
+
+<file path=ppt/slides/slide4.xml><?xml version="1.0" encoding="utf-8"?>
+<p:sld xmlns:a="http://schemas.openxmlformats.org/drawingml/2006/main" xmlns:r="http://schemas.openxmlformats.org/officeDocument/2006/relationships" xmlns:p="http://schemas.openxmlformats.org/presentationml/2006/main">
+  <p:cSld>
+    <p:spTree>
+      <p:nvGrpSpPr>
+        <p:cNvPr id="1" name=""/>
+        <p:cNvGrpSpPr/>
+        <p:nvPr/>
+      </p:nvGrpSpPr>
+      <p:grpSpPr>
+        <a:xfrm>
+          <a:off x="0" y="0"/>
+          <a:ext cx="0" cy="0"/>
+          <a:chOff x="0" y="0"/>
+          <a:chExt cx="0" cy="0"/>
+        </a:xfrm>
+      </p:grpSpPr>
+      <p:sp>
+        <p:nvSpPr>
+          <p:cNvPr id="2" name="Title 1"/>
+          <p:cNvSpPr>
+            <a:spLocks noGrp="1"/>
+          </p:cNvSpPr>
+          <p:nvPr>
+            <p:ph type="title"/>
+          </p:nvPr>
+        </p:nvSpPr>
+        <p:spPr/>
+        <p:txBody>
+          <a:bodyPr/>
+          <a:lstStyle/>
+          <a:p>
+            <a:r>
+              <a:rPr lang="en-US" dirty="0" smtClean="0"/>
+              <a:t>02/21/23 Status Update</a:t>
+            </a:r>
+            <a:endParaRPr lang="en-US" dirty="0"/>
+          </a:p>
+        </p:txBody>
+      </p:sp>
+      <p:sp>
+        <p:nvSpPr>
+          <p:cNvPr id="3" name="Content Placeholder 2"/>
+          <p:cNvSpPr>
+            <a:spLocks noGrp="1"/>
+          </p:cNvSpPr>
+          <p:nvPr>
+            <p:ph sz="half" idx="1"/>
+          </p:nvPr>
+        </p:nvSpPr>
+        <p:spPr/>
+        <p:txBody>
+          <a:bodyPr>
+            <a:normAutofit fontScale="92500" lnSpcReduction="20000"/>
+          </a:bodyPr>
+          <a:lstStyle/>
+          <a:p>
+            <a:r>
+              <a:rPr lang="en-US" dirty="0" smtClean="0">
+                <a:hlinkClick r:id="rId2"/>
+              </a:rPr>
+              <a:t>Current actively updated model</a:t>
+            </a:r>
+            <a:endParaRPr lang="en-US" dirty="0" smtClean="0"/>
+          </a:p>
+          <a:p>
+            <a:r>
+              <a:rPr lang="en-US" dirty="0" smtClean="0"/>
+              <a:t>Progress:</a:t>
+            </a:r>
+          </a:p>
+          <a:p>
+            <a:pPr lvl="1"/>
+            <a:r>
+              <a:rPr lang="en-US" dirty="0" smtClean="0"/>
+              <a:t>Model converges</a:t>
+            </a:r>
+          </a:p>
+          <a:p>
+            <a:pPr lvl="2"/>
+            <a:r>
+              <a:rPr lang="en-US" dirty="0" smtClean="0"/>
+              <a:t>Positive definite Hessian</a:t>
+            </a:r>
+          </a:p>
+          <a:p>
+            <a:pPr lvl="2"/>
+            <a:r>
+              <a:rPr lang="en-US" dirty="0" smtClean="0"/>
+              <a:t>Gradient &lt;0.0001</a:t>
+            </a:r>
+          </a:p>
+          <a:p>
+            <a:pPr lvl="2"/>
+            <a:r>
+              <a:rPr lang="en-US" dirty="0" smtClean="0"/>
+              <a:t>Fits data reasonably/no parameters on the bounds</a:t>
+            </a:r>
+          </a:p>
+          <a:p>
+            <a:pPr lvl="1"/>
+            <a:r>
+              <a:rPr lang="en-US" dirty="0" smtClean="0"/>
+              <a:t>Initial equilibrium catch likelihood problem</a:t>
+            </a:r>
+          </a:p>
+          <a:p>
+            <a:pPr lvl="1"/>
+            <a:r>
+              <a:rPr lang="en-US" dirty="0" smtClean="0"/>
+              <a:t>Dropped JPN CODF size data</a:t>
+            </a:r>
+          </a:p>
+          <a:p>
+            <a:pPr lvl="1"/>
+            <a:r>
+              <a:rPr lang="en-US" dirty="0" smtClean="0"/>
+              <a:t>IATTC size data double normal selectivity (was asymptotic lognormal)</a:t>
+            </a:r>
+          </a:p>
+          <a:p>
+            <a:pPr lvl="1"/>
+            <a:r>
+              <a:rPr lang="en-US" dirty="0" smtClean="0"/>
+              <a:t>Removed sex-specific size data</a:t>
+            </a:r>
+            <a:endParaRPr lang="en-US" dirty="0"/>
+          </a:p>
+        </p:txBody>
+      </p:sp>
+      <p:sp>
+        <p:nvSpPr>
+          <p:cNvPr id="4" name="Content Placeholder 3"/>
+          <p:cNvSpPr>
+            <a:spLocks noGrp="1"/>
+          </p:cNvSpPr>
+          <p:nvPr>
+            <p:ph sz="half" idx="2"/>
+          </p:nvPr>
+        </p:nvSpPr>
+        <p:spPr/>
+        <p:txBody>
+          <a:bodyPr>
+            <a:normAutofit fontScale="92500" lnSpcReduction="20000"/>
+          </a:bodyPr>
+          <a:lstStyle/>
+          <a:p>
+            <a:r>
+              <a:rPr lang="en-US" dirty="0" smtClean="0"/>
+              <a:t>Next steps</a:t>
+            </a:r>
+          </a:p>
+          <a:p>
+            <a:pPr lvl="1"/>
+            <a:r>
+              <a:rPr lang="en-US" dirty="0" smtClean="0"/>
+              <a:t>Add back in sex-specific data</a:t>
+            </a:r>
+          </a:p>
+          <a:p>
+            <a:pPr lvl="1"/>
+            <a:r>
+              <a:rPr lang="en-US" dirty="0" smtClean="0"/>
+              <a:t>Use likelihood profile to explore dropping/down-weighting size comp or CPUE indices</a:t>
+            </a:r>
+          </a:p>
+          <a:p>
+            <a:pPr lvl="1"/>
+            <a:r>
+              <a:rPr lang="en-US" dirty="0" smtClean="0"/>
+              <a:t>Adding a few blocks to improve fit to size comp</a:t>
+            </a:r>
+          </a:p>
+          <a:p>
+            <a:pPr lvl="1"/>
+            <a:r>
+              <a:rPr lang="en-US" dirty="0" smtClean="0"/>
+              <a:t>Continue trying to solve initial equilibrium catch likelihood</a:t>
+            </a:r>
+          </a:p>
+          <a:p>
+            <a:r>
+              <a:rPr lang="en-US" dirty="0" smtClean="0"/>
+              <a:t>For future model development:</a:t>
+            </a:r>
+          </a:p>
+          <a:p>
+            <a:pPr lvl="1"/>
+            <a:r>
+              <a:rPr lang="en-US" dirty="0" smtClean="0"/>
+              <a:t>2-area model with tagging data</a:t>
+            </a:r>
+          </a:p>
+          <a:p>
+            <a:pPr lvl="1"/>
+            <a:r>
+              <a:rPr lang="en-US" dirty="0" smtClean="0"/>
+              <a:t>Explore an environmental index for recruitment?</a:t>
+            </a:r>
+            <a:endParaRPr lang="en-US" dirty="0"/>
+          </a:p>
+        </p:txBody>
+      </p:sp>
+    </p:spTree>
+    <p:extLst>
+      <p:ext uri="{BB962C8B-B14F-4D97-AF65-F5344CB8AC3E}">
+        <p14:creationId xmlns:p14="http://schemas.microsoft.com/office/powerpoint/2010/main" val="588850432"/>
+      </p:ext>
+    </p:extLst>
+  </p:cSld>
+  <p:clrMapOvr>
+    <a:masterClrMapping/>
+  </p:clrMapOvr>
+</p:sld>
+</file>
+
+<file path=ppt/slides/slide5.xml><?xml version="1.0" encoding="utf-8"?>
+<p:sld xmlns:a="http://schemas.openxmlformats.org/drawingml/2006/main" xmlns:r="http://schemas.openxmlformats.org/officeDocument/2006/relationships" xmlns:p="http://schemas.openxmlformats.org/presentationml/2006/main">
+  <p:cSld>
+    <p:spTree>
+      <p:nvGrpSpPr>
+        <p:cNvPr id="1" name=""/>
+        <p:cNvGrpSpPr/>
+        <p:nvPr/>
+      </p:nvGrpSpPr>
+      <p:grpSpPr>
+        <a:xfrm>
+          <a:off x="0" y="0"/>
+          <a:ext cx="0" cy="0"/>
+          <a:chOff x="0" y="0"/>
+          <a:chExt cx="0" cy="0"/>
+        </a:xfrm>
+      </p:grpSpPr>
+      <p:pic>
+        <p:nvPicPr>
+          <p:cNvPr id="5" name="Picture 4"/>
+          <p:cNvPicPr>
+            <a:picLocks noChangeAspect="1"/>
+          </p:cNvPicPr>
+          <p:nvPr/>
+        </p:nvPicPr>
+        <p:blipFill rotWithShape="1">
+          <a:blip r:embed="rId2" cstate="print">
+            <a:extLst>
+              <a:ext uri="{28A0092B-C50C-407E-A947-70E740481C1C}">
+                <a14:useLocalDpi xmlns:a14="http://schemas.microsoft.com/office/drawing/2010/main" val="0"/>
+              </a:ext>
+            </a:extLst>
+          </a:blip>
+          <a:srcRect t="8592"/>
+          <a:stretch/>
+        </p:blipFill>
+        <p:spPr>
+          <a:xfrm>
+            <a:off x="15722" y="0"/>
+            <a:ext cx="4149268" cy="2334003"/>
+          </a:xfrm>
+          <a:prstGeom prst="rect">
+            <a:avLst/>
+          </a:prstGeom>
+        </p:spPr>
+      </p:pic>
+      <p:pic>
+        <p:nvPicPr>
+          <p:cNvPr id="6" name="Picture 5"/>
+          <p:cNvPicPr>
+            <a:picLocks noChangeAspect="1"/>
+          </p:cNvPicPr>
+          <p:nvPr/>
+        </p:nvPicPr>
+        <p:blipFill rotWithShape="1">
+          <a:blip r:embed="rId3" cstate="print">
+            <a:extLst>
+              <a:ext uri="{28A0092B-C50C-407E-A947-70E740481C1C}">
+                <a14:useLocalDpi xmlns:a14="http://schemas.microsoft.com/office/drawing/2010/main" val="0"/>
+              </a:ext>
+            </a:extLst>
+          </a:blip>
+          <a:srcRect t="11720"/>
+          <a:stretch/>
+        </p:blipFill>
+        <p:spPr>
+          <a:xfrm>
+            <a:off x="4029447" y="174041"/>
+            <a:ext cx="4149268" cy="2254137"/>
+          </a:xfrm>
+          <a:prstGeom prst="rect">
+            <a:avLst/>
+          </a:prstGeom>
+        </p:spPr>
+      </p:pic>
+      <p:pic>
+        <p:nvPicPr>
+          <p:cNvPr id="7" name="Picture 6"/>
+          <p:cNvPicPr>
+            <a:picLocks noChangeAspect="1"/>
+          </p:cNvPicPr>
+          <p:nvPr/>
+        </p:nvPicPr>
+        <p:blipFill rotWithShape="1">
+          <a:blip r:embed="rId4" cstate="print">
+            <a:extLst>
+              <a:ext uri="{28A0092B-C50C-407E-A947-70E740481C1C}">
+                <a14:useLocalDpi xmlns:a14="http://schemas.microsoft.com/office/drawing/2010/main" val="0"/>
+              </a:ext>
+            </a:extLst>
+          </a:blip>
+          <a:srcRect t="10701"/>
+          <a:stretch/>
+        </p:blipFill>
+        <p:spPr>
+          <a:xfrm>
+            <a:off x="8043172" y="46767"/>
+            <a:ext cx="4149268" cy="2280160"/>
+          </a:xfrm>
+          <a:prstGeom prst="rect">
+            <a:avLst/>
+          </a:prstGeom>
+        </p:spPr>
+      </p:pic>
+      <p:pic>
+        <p:nvPicPr>
+          <p:cNvPr id="8" name="Picture 7"/>
+          <p:cNvPicPr>
+            <a:picLocks noChangeAspect="1"/>
+          </p:cNvPicPr>
+          <p:nvPr/>
+        </p:nvPicPr>
+        <p:blipFill rotWithShape="1">
+          <a:blip r:embed="rId5" cstate="print">
+            <a:extLst>
+              <a:ext uri="{28A0092B-C50C-407E-A947-70E740481C1C}">
+                <a14:useLocalDpi xmlns:a14="http://schemas.microsoft.com/office/drawing/2010/main" val="0"/>
+              </a:ext>
+            </a:extLst>
+          </a:blip>
+          <a:srcRect t="14276"/>
+          <a:stretch/>
+        </p:blipFill>
+        <p:spPr>
+          <a:xfrm>
+            <a:off x="1498726" y="2372091"/>
+            <a:ext cx="4149268" cy="2188861"/>
+          </a:xfrm>
+          <a:prstGeom prst="rect">
+            <a:avLst/>
+          </a:prstGeom>
+        </p:spPr>
+      </p:pic>
+      <p:pic>
+        <p:nvPicPr>
+          <p:cNvPr id="9" name="Picture 8"/>
+          <p:cNvPicPr>
+            <a:picLocks noChangeAspect="1"/>
+          </p:cNvPicPr>
+          <p:nvPr/>
+        </p:nvPicPr>
+        <p:blipFill rotWithShape="1">
+          <a:blip r:embed="rId6" cstate="print">
+            <a:extLst>
+              <a:ext uri="{28A0092B-C50C-407E-A947-70E740481C1C}">
+                <a14:useLocalDpi xmlns:a14="http://schemas.microsoft.com/office/drawing/2010/main" val="0"/>
+              </a:ext>
+            </a:extLst>
+          </a:blip>
+          <a:srcRect t="11556"/>
+          <a:stretch/>
+        </p:blipFill>
+        <p:spPr>
+          <a:xfrm>
+            <a:off x="5647994" y="2302625"/>
+            <a:ext cx="4149268" cy="2258327"/>
+          </a:xfrm>
+          <a:prstGeom prst="rect">
+            <a:avLst/>
+          </a:prstGeom>
+        </p:spPr>
+      </p:pic>
+      <p:pic>
+        <p:nvPicPr>
+          <p:cNvPr id="10" name="Picture 9"/>
+          <p:cNvPicPr>
+            <a:picLocks noChangeAspect="1"/>
+          </p:cNvPicPr>
+          <p:nvPr/>
+        </p:nvPicPr>
+        <p:blipFill rotWithShape="1">
+          <a:blip r:embed="rId7" cstate="print">
+            <a:extLst>
+              <a:ext uri="{28A0092B-C50C-407E-A947-70E740481C1C}">
+                <a14:useLocalDpi xmlns:a14="http://schemas.microsoft.com/office/drawing/2010/main" val="0"/>
+              </a:ext>
+            </a:extLst>
+          </a:blip>
+          <a:srcRect t="14406"/>
+          <a:stretch/>
+        </p:blipFill>
+        <p:spPr>
+          <a:xfrm>
+            <a:off x="0" y="4655127"/>
+            <a:ext cx="4149268" cy="2185556"/>
+          </a:xfrm>
+          <a:prstGeom prst="rect">
+            <a:avLst/>
+          </a:prstGeom>
+        </p:spPr>
+      </p:pic>
+      <p:pic>
+        <p:nvPicPr>
+          <p:cNvPr id="11" name="Picture 10"/>
+          <p:cNvPicPr>
+            <a:picLocks noChangeAspect="1"/>
+          </p:cNvPicPr>
+          <p:nvPr/>
+        </p:nvPicPr>
+        <p:blipFill>
+          <a:blip r:embed="rId8" cstate="print">
+            <a:extLst>
+              <a:ext uri="{28A0092B-C50C-407E-A947-70E740481C1C}">
+                <a14:useLocalDpi xmlns:a14="http://schemas.microsoft.com/office/drawing/2010/main" val="0"/>
+              </a:ext>
+            </a:extLst>
+          </a:blip>
+          <a:stretch>
+            <a:fillRect/>
+          </a:stretch>
+        </p:blipFill>
+        <p:spPr>
+          <a:xfrm>
+            <a:off x="4029447" y="4308415"/>
+            <a:ext cx="4149268" cy="2553395"/>
+          </a:xfrm>
+          <a:prstGeom prst="rect">
+            <a:avLst/>
+          </a:prstGeom>
+        </p:spPr>
+      </p:pic>
+      <p:pic>
+        <p:nvPicPr>
+          <p:cNvPr id="12" name="Picture 11"/>
+          <p:cNvPicPr>
+            <a:picLocks noChangeAspect="1"/>
+          </p:cNvPicPr>
+          <p:nvPr/>
+        </p:nvPicPr>
+        <p:blipFill>
+          <a:blip r:embed="rId9" cstate="print">
+            <a:extLst>
+              <a:ext uri="{28A0092B-C50C-407E-A947-70E740481C1C}">
+                <a14:useLocalDpi xmlns:a14="http://schemas.microsoft.com/office/drawing/2010/main" val="0"/>
+              </a:ext>
+            </a:extLst>
+          </a:blip>
+          <a:stretch>
+            <a:fillRect/>
+          </a:stretch>
+        </p:blipFill>
+        <p:spPr>
+          <a:xfrm>
+            <a:off x="7976670" y="4205919"/>
+            <a:ext cx="4149268" cy="2553395"/>
+          </a:xfrm>
+          <a:prstGeom prst="rect">
+            <a:avLst/>
+          </a:prstGeom>
+        </p:spPr>
+      </p:pic>
+      <p:sp>
+        <p:nvSpPr>
+          <p:cNvPr id="13" name="TextBox 12"/>
+          <p:cNvSpPr txBox="1"/>
+          <p:nvPr/>
+        </p:nvSpPr>
+        <p:spPr>
+          <a:xfrm>
+            <a:off x="432471" y="214855"/>
+            <a:ext cx="2792203" cy="276999"/>
+          </a:xfrm>
+          <a:prstGeom prst="rect">
+            <a:avLst/>
+          </a:prstGeom>
+          <a:noFill/>
+        </p:spPr>
+        <p:txBody>
+          <a:bodyPr wrap="square" rtlCol="0">
+            <a:spAutoFit/>
+          </a:bodyPr>
+          <a:lstStyle/>
+          <a:p>
+            <a:r>
+              <a:rPr lang="en-US" sz="1200" dirty="0"/>
+              <a:t>S1_JPN_WCNPO_OSDWLL_early_Area1</a:t>
+            </a:r>
+          </a:p>
+        </p:txBody>
+      </p:sp>
+      <p:sp>
+        <p:nvSpPr>
+          <p:cNvPr id="14" name="TextBox 13"/>
+          <p:cNvSpPr txBox="1"/>
+          <p:nvPr/>
+        </p:nvSpPr>
+        <p:spPr>
+          <a:xfrm>
+            <a:off x="8822448" y="214855"/>
+            <a:ext cx="2870019" cy="276999"/>
+          </a:xfrm>
+          <a:prstGeom prst="rect">
+            <a:avLst/>
+          </a:prstGeom>
+          <a:noFill/>
+        </p:spPr>
+        <p:txBody>
+          <a:bodyPr wrap="square" rtlCol="0">
+            <a:spAutoFit/>
+          </a:bodyPr>
+          <a:lstStyle/>
+          <a:p>
+            <a:r>
+              <a:rPr lang="en-US" sz="1200" dirty="0"/>
+              <a:t>S3_JPN_WCNPO_OSDWLL_early_Area2</a:t>
+            </a:r>
+          </a:p>
+        </p:txBody>
+      </p:sp>
+      <p:sp>
+        <p:nvSpPr>
+          <p:cNvPr id="15" name="TextBox 14"/>
+          <p:cNvSpPr txBox="1"/>
+          <p:nvPr/>
+        </p:nvSpPr>
+        <p:spPr>
+          <a:xfrm>
+            <a:off x="4463053" y="331928"/>
+            <a:ext cx="2775346" cy="276999"/>
+          </a:xfrm>
+          <a:prstGeom prst="rect">
+            <a:avLst/>
+          </a:prstGeom>
+          <a:noFill/>
+        </p:spPr>
+        <p:txBody>
+          <a:bodyPr wrap="square" rtlCol="0">
+            <a:spAutoFit/>
+          </a:bodyPr>
+          <a:lstStyle/>
+          <a:p>
+            <a:r>
+              <a:rPr lang="en-US" sz="1200" dirty="0"/>
+              <a:t>S2_JPN_WCNPO_OSDWCOLL_late_Area1</a:t>
+            </a:r>
+          </a:p>
+        </p:txBody>
+      </p:sp>
+      <p:sp>
+        <p:nvSpPr>
+          <p:cNvPr id="16" name="TextBox 15"/>
+          <p:cNvSpPr txBox="1"/>
+          <p:nvPr/>
+        </p:nvSpPr>
+        <p:spPr>
+          <a:xfrm>
+            <a:off x="6827274" y="2484814"/>
+            <a:ext cx="2702882" cy="276999"/>
+          </a:xfrm>
+          <a:prstGeom prst="rect">
+            <a:avLst/>
+          </a:prstGeom>
+          <a:noFill/>
+        </p:spPr>
+        <p:txBody>
+          <a:bodyPr wrap="square" rtlCol="0">
+            <a:spAutoFit/>
+          </a:bodyPr>
+          <a:lstStyle/>
+          <a:p>
+            <a:r>
+              <a:rPr lang="en-US" sz="1200" dirty="0"/>
+              <a:t>S5_TWN_WCNPO_DWLL_late</a:t>
+            </a:r>
+          </a:p>
+        </p:txBody>
+      </p:sp>
+      <p:sp>
+        <p:nvSpPr>
+          <p:cNvPr id="17" name="TextBox 16"/>
+          <p:cNvSpPr txBox="1"/>
+          <p:nvPr/>
+        </p:nvSpPr>
+        <p:spPr>
+          <a:xfrm>
+            <a:off x="1214834" y="4797800"/>
+            <a:ext cx="2720418" cy="276999"/>
+          </a:xfrm>
+          <a:prstGeom prst="rect">
+            <a:avLst/>
+          </a:prstGeom>
+          <a:noFill/>
+        </p:spPr>
+        <p:txBody>
+          <a:bodyPr wrap="square" rtlCol="0">
+            <a:spAutoFit/>
+          </a:bodyPr>
+          <a:lstStyle/>
+          <a:p>
+            <a:r>
+              <a:rPr lang="en-US" sz="1200" dirty="0"/>
+              <a:t>S6_US_WCNPO_LL_deep</a:t>
+            </a:r>
+          </a:p>
+        </p:txBody>
+      </p:sp>
+      <p:sp>
+        <p:nvSpPr>
+          <p:cNvPr id="18" name="TextBox 17"/>
+          <p:cNvSpPr txBox="1"/>
+          <p:nvPr/>
+        </p:nvSpPr>
+        <p:spPr>
+          <a:xfrm>
+            <a:off x="4918961" y="5848062"/>
+            <a:ext cx="2684106" cy="276999"/>
+          </a:xfrm>
+          <a:prstGeom prst="rect">
+            <a:avLst/>
+          </a:prstGeom>
+          <a:noFill/>
+        </p:spPr>
+        <p:txBody>
+          <a:bodyPr wrap="square" rtlCol="0">
+            <a:spAutoFit/>
+          </a:bodyPr>
+          <a:lstStyle/>
+          <a:p>
+            <a:r>
+              <a:rPr lang="en-US" sz="1200" dirty="0"/>
+              <a:t>S7_US_WCNPO_LL_shallow_early</a:t>
+            </a:r>
+            <a:r>
+              <a:rPr lang="en-US" sz="1000" dirty="0"/>
+              <a:t> </a:t>
+            </a:r>
+          </a:p>
+        </p:txBody>
+      </p:sp>
+      <p:sp>
+        <p:nvSpPr>
+          <p:cNvPr id="20" name="TextBox 19"/>
+          <p:cNvSpPr txBox="1"/>
+          <p:nvPr/>
+        </p:nvSpPr>
+        <p:spPr>
+          <a:xfrm>
+            <a:off x="9130355" y="4659301"/>
+            <a:ext cx="2731445" cy="276999"/>
+          </a:xfrm>
+          <a:prstGeom prst="rect">
+            <a:avLst/>
+          </a:prstGeom>
+          <a:noFill/>
+        </p:spPr>
+        <p:txBody>
+          <a:bodyPr wrap="square" rtlCol="0">
+            <a:spAutoFit/>
+          </a:bodyPr>
+          <a:lstStyle/>
+          <a:p>
+            <a:r>
+              <a:rPr lang="en-US" sz="1200" dirty="0"/>
+              <a:t>S8_US_WCNPO_LL_shallow_late</a:t>
+            </a:r>
+          </a:p>
+        </p:txBody>
+      </p:sp>
+      <p:sp>
+        <p:nvSpPr>
+          <p:cNvPr id="21" name="Rectangle 20"/>
+          <p:cNvSpPr/>
+          <p:nvPr/>
+        </p:nvSpPr>
+        <p:spPr>
+          <a:xfrm>
+            <a:off x="2337613" y="2428178"/>
+            <a:ext cx="2581348" cy="276999"/>
+          </a:xfrm>
+          <a:prstGeom prst="rect">
+            <a:avLst/>
+          </a:prstGeom>
+        </p:spPr>
+        <p:txBody>
+          <a:bodyPr wrap="none">
+            <a:spAutoFit/>
+          </a:bodyPr>
+          <a:lstStyle/>
+          <a:p>
+            <a:r>
+              <a:rPr lang="en-US" sz="1200" dirty="0"/>
+              <a:t>S4_JPN_WCNPO_OSDWLL_late_Area2</a:t>
+            </a:r>
+          </a:p>
+        </p:txBody>
+      </p:sp>
+    </p:spTree>
+    <p:extLst>
+      <p:ext uri="{BB962C8B-B14F-4D97-AF65-F5344CB8AC3E}">
+        <p14:creationId xmlns:p14="http://schemas.microsoft.com/office/powerpoint/2010/main" val="1202298766"/>
+      </p:ext>
+    </p:extLst>
+  </p:cSld>
+  <p:clrMapOvr>
+    <a:masterClrMapping/>
+  </p:clrMapOvr>
+</p:sld>
+</file>
+
+<file path=ppt/slides/slide6.xml><?xml version="1.0" encoding="utf-8"?>
+<p:sld xmlns:a="http://schemas.openxmlformats.org/drawingml/2006/main" xmlns:r="http://schemas.openxmlformats.org/officeDocument/2006/relationships" xmlns:p="http://schemas.openxmlformats.org/presentationml/2006/main">
+  <p:cSld>
+    <p:spTree>
+      <p:nvGrpSpPr>
+        <p:cNvPr id="1" name=""/>
+        <p:cNvGrpSpPr/>
+        <p:nvPr/>
+      </p:nvGrpSpPr>
+      <p:grpSpPr>
+        <a:xfrm>
+          <a:off x="0" y="0"/>
+          <a:ext cx="0" cy="0"/>
+          <a:chOff x="0" y="0"/>
+          <a:chExt cx="0" cy="0"/>
+        </a:xfrm>
+      </p:grpSpPr>
+      <p:pic>
+        <p:nvPicPr>
+          <p:cNvPr id="2" name="Picture 1"/>
+          <p:cNvPicPr>
+            <a:picLocks noChangeAspect="1"/>
+          </p:cNvPicPr>
+          <p:nvPr/>
+        </p:nvPicPr>
+        <p:blipFill>
+          <a:blip r:embed="rId2" cstate="print">
+            <a:extLst>
+              <a:ext uri="{28A0092B-C50C-407E-A947-70E740481C1C}">
+                <a14:useLocalDpi xmlns:a14="http://schemas.microsoft.com/office/drawing/2010/main" val="0"/>
+              </a:ext>
+            </a:extLst>
+          </a:blip>
+          <a:stretch>
+            <a:fillRect/>
+          </a:stretch>
+        </p:blipFill>
+        <p:spPr>
+          <a:xfrm>
+            <a:off x="3124194" y="457194"/>
+            <a:ext cx="5943612" cy="5943612"/>
+          </a:xfrm>
+          <a:prstGeom prst="rect">
+            <a:avLst/>
+          </a:prstGeom>
+        </p:spPr>
+      </p:pic>
+    </p:spTree>
+    <p:extLst>
+      <p:ext uri="{BB962C8B-B14F-4D97-AF65-F5344CB8AC3E}">
+        <p14:creationId xmlns:p14="http://schemas.microsoft.com/office/powerpoint/2010/main" val="3895478371"/>
+      </p:ext>
+    </p:extLst>
+  </p:cSld>
+  <p:clrMapOvr>
+    <a:masterClrMapping/>
+  </p:clrMapOvr>
+</p:sld>
+</file>
+
+<file path=ppt/slides/slide7.xml><?xml version="1.0" encoding="utf-8"?>
+<p:sld xmlns:a="http://schemas.openxmlformats.org/drawingml/2006/main" xmlns:r="http://schemas.openxmlformats.org/officeDocument/2006/relationships" xmlns:p="http://schemas.openxmlformats.org/presentationml/2006/main">
+  <p:cSld>
+    <p:spTree>
+      <p:nvGrpSpPr>
+        <p:cNvPr id="1" name=""/>
+        <p:cNvGrpSpPr/>
+        <p:nvPr/>
+      </p:nvGrpSpPr>
+      <p:grpSpPr>
+        <a:xfrm>
+          <a:off x="0" y="0"/>
+          <a:ext cx="0" cy="0"/>
+          <a:chOff x="0" y="0"/>
+          <a:chExt cx="0" cy="0"/>
+        </a:xfrm>
+      </p:grpSpPr>
+      <p:pic>
+        <p:nvPicPr>
+          <p:cNvPr id="5" name="Picture 4"/>
+          <p:cNvPicPr>
+            <a:picLocks noChangeAspect="1"/>
+          </p:cNvPicPr>
+          <p:nvPr/>
+        </p:nvPicPr>
+        <p:blipFill>
+          <a:blip r:embed="rId2" cstate="print">
+            <a:extLst>
+              <a:ext uri="{28A0092B-C50C-407E-A947-70E740481C1C}">
+                <a14:useLocalDpi xmlns:a14="http://schemas.microsoft.com/office/drawing/2010/main" val="0"/>
+              </a:ext>
+            </a:extLst>
+          </a:blip>
+          <a:stretch>
+            <a:fillRect/>
+          </a:stretch>
+        </p:blipFill>
+        <p:spPr>
+          <a:xfrm>
+            <a:off x="0" y="378594"/>
+            <a:ext cx="5943612" cy="5943612"/>
+          </a:xfrm>
+          <a:prstGeom prst="rect">
+            <a:avLst/>
+          </a:prstGeom>
+        </p:spPr>
+      </p:pic>
+      <p:pic>
+        <p:nvPicPr>
+          <p:cNvPr id="6" name="Picture 5"/>
+          <p:cNvPicPr>
+            <a:picLocks noChangeAspect="1"/>
+          </p:cNvPicPr>
+          <p:nvPr/>
+        </p:nvPicPr>
+        <p:blipFill>
+          <a:blip r:embed="rId3" cstate="print">
+            <a:extLst>
+              <a:ext uri="{28A0092B-C50C-407E-A947-70E740481C1C}">
+                <a14:useLocalDpi xmlns:a14="http://schemas.microsoft.com/office/drawing/2010/main" val="0"/>
+              </a:ext>
+            </a:extLst>
+          </a:blip>
+          <a:stretch>
+            <a:fillRect/>
+          </a:stretch>
+        </p:blipFill>
+        <p:spPr>
+          <a:xfrm>
+            <a:off x="6096000" y="378594"/>
+            <a:ext cx="5943612" cy="5943612"/>
+          </a:xfrm>
+          <a:prstGeom prst="rect">
+            <a:avLst/>
+          </a:prstGeom>
+        </p:spPr>
+      </p:pic>
+    </p:spTree>
+    <p:extLst>
+      <p:ext uri="{BB962C8B-B14F-4D97-AF65-F5344CB8AC3E}">
+        <p14:creationId xmlns:p14="http://schemas.microsoft.com/office/powerpoint/2010/main" val="1552856677"/>
+      </p:ext>
+    </p:extLst>
+  </p:cSld>
+  <p:clrMapOvr>
+    <a:masterClrMapping/>
+  </p:clrMapOvr>
+</p:sld>
+</file>
+
+<file path=ppt/slides/slide8.xml><?xml version="1.0" encoding="utf-8"?>
+<p:sld xmlns:a="http://schemas.openxmlformats.org/drawingml/2006/main" xmlns:r="http://schemas.openxmlformats.org/officeDocument/2006/relationships" xmlns:p="http://schemas.openxmlformats.org/presentationml/2006/main">
+  <p:cSld>
+    <p:spTree>
+      <p:nvGrpSpPr>
+        <p:cNvPr id="1" name=""/>
+        <p:cNvGrpSpPr/>
+        <p:nvPr/>
+      </p:nvGrpSpPr>
+      <p:grpSpPr>
+        <a:xfrm>
+          <a:off x="0" y="0"/>
+          <a:ext cx="0" cy="0"/>
+          <a:chOff x="0" y="0"/>
+          <a:chExt cx="0" cy="0"/>
+        </a:xfrm>
+      </p:grpSpPr>
+      <p:pic>
+        <p:nvPicPr>
+          <p:cNvPr id="2" name="Picture 1"/>
+          <p:cNvPicPr>
+            <a:picLocks noChangeAspect="1"/>
+          </p:cNvPicPr>
+          <p:nvPr/>
+        </p:nvPicPr>
+        <p:blipFill>
+          <a:blip r:embed="rId2" cstate="print">
+            <a:extLst>
+              <a:ext uri="{28A0092B-C50C-407E-A947-70E740481C1C}">
+                <a14:useLocalDpi xmlns:a14="http://schemas.microsoft.com/office/drawing/2010/main" val="0"/>
+              </a:ext>
+            </a:extLst>
+          </a:blip>
+          <a:stretch>
+            <a:fillRect/>
+          </a:stretch>
+        </p:blipFill>
+        <p:spPr>
+          <a:xfrm>
+            <a:off x="209638" y="247650"/>
+            <a:ext cx="2845569" cy="2845569"/>
+          </a:xfrm>
+          <a:prstGeom prst="rect">
+            <a:avLst/>
+          </a:prstGeom>
+        </p:spPr>
+      </p:pic>
+      <p:pic>
+        <p:nvPicPr>
+          <p:cNvPr id="3" name="Picture 2"/>
+          <p:cNvPicPr>
+            <a:picLocks noChangeAspect="1"/>
+          </p:cNvPicPr>
+          <p:nvPr/>
+        </p:nvPicPr>
+        <p:blipFill>
+          <a:blip r:embed="rId3" cstate="print">
+            <a:extLst>
+              <a:ext uri="{28A0092B-C50C-407E-A947-70E740481C1C}">
+                <a14:useLocalDpi xmlns:a14="http://schemas.microsoft.com/office/drawing/2010/main" val="0"/>
+              </a:ext>
+            </a:extLst>
+          </a:blip>
+          <a:stretch>
+            <a:fillRect/>
+          </a:stretch>
+        </p:blipFill>
+        <p:spPr>
+          <a:xfrm>
+            <a:off x="3222563" y="247649"/>
+            <a:ext cx="2845569" cy="2845569"/>
+          </a:xfrm>
+          <a:prstGeom prst="rect">
+            <a:avLst/>
+          </a:prstGeom>
+        </p:spPr>
+      </p:pic>
+      <p:pic>
+        <p:nvPicPr>
+          <p:cNvPr id="4" name="Picture 3"/>
+          <p:cNvPicPr>
+            <a:picLocks noChangeAspect="1"/>
+          </p:cNvPicPr>
+          <p:nvPr/>
+        </p:nvPicPr>
+        <p:blipFill>
+          <a:blip r:embed="rId4" cstate="print">
+            <a:extLst>
+              <a:ext uri="{28A0092B-C50C-407E-A947-70E740481C1C}">
+                <a14:useLocalDpi xmlns:a14="http://schemas.microsoft.com/office/drawing/2010/main" val="0"/>
+              </a:ext>
+            </a:extLst>
+          </a:blip>
+          <a:stretch>
+            <a:fillRect/>
+          </a:stretch>
+        </p:blipFill>
+        <p:spPr>
+          <a:xfrm>
+            <a:off x="6281864" y="247648"/>
+            <a:ext cx="2845569" cy="2845569"/>
+          </a:xfrm>
+          <a:prstGeom prst="rect">
+            <a:avLst/>
+          </a:prstGeom>
+        </p:spPr>
+      </p:pic>
+      <p:pic>
+        <p:nvPicPr>
+          <p:cNvPr id="5" name="Picture 4"/>
+          <p:cNvPicPr>
+            <a:picLocks noChangeAspect="1"/>
+          </p:cNvPicPr>
+          <p:nvPr/>
+        </p:nvPicPr>
+        <p:blipFill>
+          <a:blip r:embed="rId5" cstate="print">
+            <a:extLst>
+              <a:ext uri="{28A0092B-C50C-407E-A947-70E740481C1C}">
+                <a14:useLocalDpi xmlns:a14="http://schemas.microsoft.com/office/drawing/2010/main" val="0"/>
+              </a:ext>
+            </a:extLst>
+          </a:blip>
+          <a:stretch>
+            <a:fillRect/>
+          </a:stretch>
+        </p:blipFill>
+        <p:spPr>
+          <a:xfrm>
+            <a:off x="9196424" y="164329"/>
+            <a:ext cx="2845569" cy="2845569"/>
+          </a:xfrm>
+          <a:prstGeom prst="rect">
+            <a:avLst/>
+          </a:prstGeom>
+        </p:spPr>
+      </p:pic>
+      <p:pic>
+        <p:nvPicPr>
+          <p:cNvPr id="6" name="Picture 5"/>
+          <p:cNvPicPr>
+            <a:picLocks noChangeAspect="1"/>
+          </p:cNvPicPr>
+          <p:nvPr/>
+        </p:nvPicPr>
+        <p:blipFill>
+          <a:blip r:embed="rId6" cstate="print">
+            <a:extLst>
+              <a:ext uri="{28A0092B-C50C-407E-A947-70E740481C1C}">
+                <a14:useLocalDpi xmlns:a14="http://schemas.microsoft.com/office/drawing/2010/main" val="0"/>
+              </a:ext>
+            </a:extLst>
+          </a:blip>
+          <a:stretch>
+            <a:fillRect/>
+          </a:stretch>
+        </p:blipFill>
+        <p:spPr>
+          <a:xfrm>
+            <a:off x="301405" y="3427803"/>
+            <a:ext cx="2886006" cy="2886006"/>
+          </a:xfrm>
+          <a:prstGeom prst="rect">
+            <a:avLst/>
+          </a:prstGeom>
+        </p:spPr>
+      </p:pic>
+      <p:pic>
+        <p:nvPicPr>
+          <p:cNvPr id="7" name="Picture 6"/>
+          <p:cNvPicPr>
+            <a:picLocks noChangeAspect="1"/>
+          </p:cNvPicPr>
+          <p:nvPr/>
+        </p:nvPicPr>
+        <p:blipFill>
+          <a:blip r:embed="rId7" cstate="print">
+            <a:extLst>
+              <a:ext uri="{28A0092B-C50C-407E-A947-70E740481C1C}">
+                <a14:useLocalDpi xmlns:a14="http://schemas.microsoft.com/office/drawing/2010/main" val="0"/>
+              </a:ext>
+            </a:extLst>
+          </a:blip>
+          <a:stretch>
+            <a:fillRect/>
+          </a:stretch>
+        </p:blipFill>
+        <p:spPr>
+          <a:xfrm>
+            <a:off x="3325549" y="3427803"/>
+            <a:ext cx="2886006" cy="2886006"/>
+          </a:xfrm>
+          <a:prstGeom prst="rect">
+            <a:avLst/>
+          </a:prstGeom>
+        </p:spPr>
+      </p:pic>
+      <p:pic>
+        <p:nvPicPr>
+          <p:cNvPr id="8" name="Picture 7"/>
+          <p:cNvPicPr>
+            <a:picLocks noChangeAspect="1"/>
+          </p:cNvPicPr>
+          <p:nvPr/>
+        </p:nvPicPr>
+        <p:blipFill>
+          <a:blip r:embed="rId8" cstate="print">
+            <a:extLst>
+              <a:ext uri="{28A0092B-C50C-407E-A947-70E740481C1C}">
+                <a14:useLocalDpi xmlns:a14="http://schemas.microsoft.com/office/drawing/2010/main" val="0"/>
+              </a:ext>
+            </a:extLst>
+          </a:blip>
+          <a:stretch>
+            <a:fillRect/>
+          </a:stretch>
+        </p:blipFill>
+        <p:spPr>
+          <a:xfrm>
+            <a:off x="6436725" y="3427803"/>
+            <a:ext cx="2886006" cy="2886006"/>
+          </a:xfrm>
+          <a:prstGeom prst="rect">
+            <a:avLst/>
+          </a:prstGeom>
+        </p:spPr>
+      </p:pic>
+      <p:pic>
+        <p:nvPicPr>
+          <p:cNvPr id="9" name="Picture 8"/>
+          <p:cNvPicPr>
+            <a:picLocks noChangeAspect="1"/>
+          </p:cNvPicPr>
+          <p:nvPr/>
+        </p:nvPicPr>
+        <p:blipFill>
+          <a:blip r:embed="rId9" cstate="print">
+            <a:extLst>
+              <a:ext uri="{28A0092B-C50C-407E-A947-70E740481C1C}">
+                <a14:useLocalDpi xmlns:a14="http://schemas.microsoft.com/office/drawing/2010/main" val="0"/>
+              </a:ext>
+            </a:extLst>
+          </a:blip>
+          <a:stretch>
+            <a:fillRect/>
+          </a:stretch>
+        </p:blipFill>
+        <p:spPr>
+          <a:xfrm>
+            <a:off x="9322731" y="3427803"/>
+            <a:ext cx="2886006" cy="2886006"/>
+          </a:xfrm>
+          <a:prstGeom prst="rect">
+            <a:avLst/>
+          </a:prstGeom>
+        </p:spPr>
+      </p:pic>
+    </p:spTree>
+    <p:extLst>
+      <p:ext uri="{BB962C8B-B14F-4D97-AF65-F5344CB8AC3E}">
+        <p14:creationId xmlns:p14="http://schemas.microsoft.com/office/powerpoint/2010/main" val="712346475"/>
+      </p:ext>
+    </p:extLst>
+  </p:cSld>
+  <p:clrMapOvr>
+    <a:masterClrMapping/>
+  </p:clrMapOvr>
+</p:sld>
+</file>
+
+<file path=ppt/slides/slide9.xml><?xml version="1.0" encoding="utf-8"?>
+<p:sld xmlns:a="http://schemas.openxmlformats.org/drawingml/2006/main" xmlns:r="http://schemas.openxmlformats.org/officeDocument/2006/relationships" xmlns:p="http://schemas.openxmlformats.org/presentationml/2006/main">
+  <p:cSld>
+    <p:spTree>
+      <p:nvGrpSpPr>
+        <p:cNvPr id="1" name=""/>
+        <p:cNvGrpSpPr/>
+        <p:nvPr/>
+      </p:nvGrpSpPr>
+      <p:grpSpPr>
+        <a:xfrm>
+          <a:off x="0" y="0"/>
+          <a:ext cx="0" cy="0"/>
+          <a:chOff x="0" y="0"/>
+          <a:chExt cx="0" cy="0"/>
+        </a:xfrm>
+      </p:grpSpPr>
+      <p:pic>
+        <p:nvPicPr>
+          <p:cNvPr id="7" name="Picture 6"/>
+          <p:cNvPicPr>
+            <a:picLocks noChangeAspect="1"/>
+          </p:cNvPicPr>
+          <p:nvPr/>
+        </p:nvPicPr>
+        <p:blipFill>
+          <a:blip r:embed="rId2"/>
+          <a:stretch>
+            <a:fillRect/>
+          </a:stretch>
+        </p:blipFill>
+        <p:spPr>
+          <a:xfrm>
+            <a:off x="204749" y="132541"/>
+            <a:ext cx="11512412" cy="5052513"/>
+          </a:xfrm>
+          <a:prstGeom prst="rect">
+            <a:avLst/>
+          </a:prstGeom>
+        </p:spPr>
+      </p:pic>
+      <p:sp>
+        <p:nvSpPr>
+          <p:cNvPr id="8" name="TextBox 7"/>
+          <p:cNvSpPr txBox="1"/>
+          <p:nvPr/>
+        </p:nvSpPr>
+        <p:spPr>
+          <a:xfrm>
+            <a:off x="1030778" y="5436524"/>
+            <a:ext cx="3258589" cy="923330"/>
+          </a:xfrm>
+          <a:prstGeom prst="rect">
+            <a:avLst/>
+          </a:prstGeom>
+          <a:noFill/>
+        </p:spPr>
+        <p:txBody>
+          <a:bodyPr wrap="square" rtlCol="0">
+            <a:spAutoFit/>
+          </a:bodyPr>
+          <a:lstStyle/>
+          <a:p>
+            <a:r>
+              <a:rPr lang="en-US" dirty="0" smtClean="0"/>
+              <a:t>CPUE min: 6.8</a:t>
+            </a:r>
+          </a:p>
+          <a:p>
+            <a:r>
+              <a:rPr lang="en-US" dirty="0" smtClean="0"/>
+              <a:t>Size comp min: 7.4</a:t>
+            </a:r>
+          </a:p>
+          <a:p>
+            <a:r>
+              <a:rPr lang="en-US" dirty="0" smtClean="0"/>
+              <a:t>Rec min: 7.0</a:t>
+            </a:r>
+            <a:endParaRPr lang="en-US" dirty="0"/>
+          </a:p>
+        </p:txBody>
+      </p:sp>
+    </p:spTree>
+    <p:extLst>
+      <p:ext uri="{BB962C8B-B14F-4D97-AF65-F5344CB8AC3E}">
+        <p14:creationId xmlns:p14="http://schemas.microsoft.com/office/powerpoint/2010/main" val="2870394501"/>
       </p:ext>
     </p:extLst>
   </p:cSld>

</xml_diff>

<commit_message>
Fixed equ catch likelihood issue, adding blocks
</commit_message>
<xml_diff>
--- a/2023 North Pacific SWO assessment.pptx
+++ b/2023 North Pacific SWO assessment.pptx
@@ -10,12 +10,14 @@
     <p:sldId id="258" r:id="rId4"/>
     <p:sldId id="259" r:id="rId5"/>
     <p:sldId id="263" r:id="rId6"/>
-    <p:sldId id="265" r:id="rId7"/>
-    <p:sldId id="264" r:id="rId8"/>
-    <p:sldId id="266" r:id="rId9"/>
-    <p:sldId id="260" r:id="rId10"/>
-    <p:sldId id="261" r:id="rId11"/>
-    <p:sldId id="262" r:id="rId12"/>
+    <p:sldId id="267" r:id="rId7"/>
+    <p:sldId id="265" r:id="rId8"/>
+    <p:sldId id="264" r:id="rId9"/>
+    <p:sldId id="266" r:id="rId10"/>
+    <p:sldId id="268" r:id="rId11"/>
+    <p:sldId id="260" r:id="rId12"/>
+    <p:sldId id="261" r:id="rId13"/>
+    <p:sldId id="262" r:id="rId14"/>
   </p:sldIdLst>
   <p:sldSz cx="12192000" cy="6858000"/>
   <p:notesSz cx="6858000" cy="9144000"/>
@@ -3063,6 +3065,176 @@
       </p:grpSpPr>
       <p:pic>
         <p:nvPicPr>
+          <p:cNvPr id="2" name="Picture 1"/>
+          <p:cNvPicPr>
+            <a:picLocks noChangeAspect="1"/>
+          </p:cNvPicPr>
+          <p:nvPr/>
+        </p:nvPicPr>
+        <p:blipFill>
+          <a:blip r:embed="rId2">
+            <a:extLst>
+              <a:ext uri="{28A0092B-C50C-407E-A947-70E740481C1C}">
+                <a14:useLocalDpi xmlns:a14="http://schemas.microsoft.com/office/drawing/2010/main" val="0"/>
+              </a:ext>
+            </a:extLst>
+          </a:blip>
+          <a:stretch>
+            <a:fillRect/>
+          </a:stretch>
+        </p:blipFill>
+        <p:spPr>
+          <a:xfrm>
+            <a:off x="2282651" y="0"/>
+            <a:ext cx="7626698" cy="6858000"/>
+          </a:xfrm>
+          <a:prstGeom prst="rect">
+            <a:avLst/>
+          </a:prstGeom>
+        </p:spPr>
+      </p:pic>
+    </p:spTree>
+    <p:extLst>
+      <p:ext uri="{BB962C8B-B14F-4D97-AF65-F5344CB8AC3E}">
+        <p14:creationId xmlns:p14="http://schemas.microsoft.com/office/powerpoint/2010/main" val="934845405"/>
+      </p:ext>
+    </p:extLst>
+  </p:cSld>
+  <p:clrMapOvr>
+    <a:masterClrMapping/>
+  </p:clrMapOvr>
+  <p:timing>
+    <p:tnLst>
+      <p:par>
+        <p:cTn id="1" dur="indefinite" restart="never" nodeType="tmRoot"/>
+      </p:par>
+    </p:tnLst>
+  </p:timing>
+</p:sld>
+</file>
+
+<file path=ppt/slides/slide11.xml><?xml version="1.0" encoding="utf-8"?>
+<p:sld xmlns:a="http://schemas.openxmlformats.org/drawingml/2006/main" xmlns:r="http://schemas.openxmlformats.org/officeDocument/2006/relationships" xmlns:p="http://schemas.openxmlformats.org/presentationml/2006/main">
+  <p:cSld>
+    <p:spTree>
+      <p:nvGrpSpPr>
+        <p:cNvPr id="1" name=""/>
+        <p:cNvGrpSpPr/>
+        <p:nvPr/>
+      </p:nvGrpSpPr>
+      <p:grpSpPr>
+        <a:xfrm>
+          <a:off x="0" y="0"/>
+          <a:ext cx="0" cy="0"/>
+          <a:chOff x="0" y="0"/>
+          <a:chExt cx="0" cy="0"/>
+        </a:xfrm>
+      </p:grpSpPr>
+      <p:pic>
+        <p:nvPicPr>
+          <p:cNvPr id="7" name="Picture 6"/>
+          <p:cNvPicPr>
+            <a:picLocks noChangeAspect="1"/>
+          </p:cNvPicPr>
+          <p:nvPr/>
+        </p:nvPicPr>
+        <p:blipFill>
+          <a:blip r:embed="rId2"/>
+          <a:stretch>
+            <a:fillRect/>
+          </a:stretch>
+        </p:blipFill>
+        <p:spPr>
+          <a:xfrm>
+            <a:off x="204749" y="132541"/>
+            <a:ext cx="11512412" cy="5052513"/>
+          </a:xfrm>
+          <a:prstGeom prst="rect">
+            <a:avLst/>
+          </a:prstGeom>
+        </p:spPr>
+      </p:pic>
+      <p:sp>
+        <p:nvSpPr>
+          <p:cNvPr id="8" name="TextBox 7"/>
+          <p:cNvSpPr txBox="1"/>
+          <p:nvPr/>
+        </p:nvSpPr>
+        <p:spPr>
+          <a:xfrm>
+            <a:off x="1030778" y="5436524"/>
+            <a:ext cx="3258589" cy="923330"/>
+          </a:xfrm>
+          <a:prstGeom prst="rect">
+            <a:avLst/>
+          </a:prstGeom>
+          <a:noFill/>
+        </p:spPr>
+        <p:txBody>
+          <a:bodyPr wrap="square" rtlCol="0">
+            <a:spAutoFit/>
+          </a:bodyPr>
+          <a:lstStyle/>
+          <a:p>
+            <a:r>
+              <a:rPr lang="en-US" dirty="0" smtClean="0"/>
+              <a:t>CPUE min: 6.8</a:t>
+            </a:r>
+          </a:p>
+          <a:p>
+            <a:r>
+              <a:rPr lang="en-US" dirty="0" smtClean="0"/>
+              <a:t>Size comp min: 7.4</a:t>
+            </a:r>
+          </a:p>
+          <a:p>
+            <a:r>
+              <a:rPr lang="en-US" dirty="0" smtClean="0"/>
+              <a:t>Rec min: 7.0</a:t>
+            </a:r>
+            <a:endParaRPr lang="en-US" dirty="0"/>
+          </a:p>
+        </p:txBody>
+      </p:sp>
+    </p:spTree>
+    <p:extLst>
+      <p:ext uri="{BB962C8B-B14F-4D97-AF65-F5344CB8AC3E}">
+        <p14:creationId xmlns:p14="http://schemas.microsoft.com/office/powerpoint/2010/main" val="2870394501"/>
+      </p:ext>
+    </p:extLst>
+  </p:cSld>
+  <p:clrMapOvr>
+    <a:masterClrMapping/>
+  </p:clrMapOvr>
+  <p:timing>
+    <p:tnLst>
+      <p:par>
+        <p:cTn id="1" dur="indefinite" restart="never" nodeType="tmRoot"/>
+      </p:par>
+    </p:tnLst>
+  </p:timing>
+</p:sld>
+</file>
+
+<file path=ppt/slides/slide12.xml><?xml version="1.0" encoding="utf-8"?>
+<p:sld xmlns:a="http://schemas.openxmlformats.org/drawingml/2006/main" xmlns:r="http://schemas.openxmlformats.org/officeDocument/2006/relationships" xmlns:p="http://schemas.openxmlformats.org/presentationml/2006/main">
+  <p:cSld>
+    <p:spTree>
+      <p:nvGrpSpPr>
+        <p:cNvPr id="1" name=""/>
+        <p:cNvGrpSpPr/>
+        <p:nvPr/>
+      </p:nvGrpSpPr>
+      <p:grpSpPr>
+        <a:xfrm>
+          <a:off x="0" y="0"/>
+          <a:ext cx="0" cy="0"/>
+          <a:chOff x="0" y="0"/>
+          <a:chExt cx="0" cy="0"/>
+        </a:xfrm>
+      </p:grpSpPr>
+      <p:pic>
+        <p:nvPicPr>
           <p:cNvPr id="6" name="Picture 5"/>
           <p:cNvPicPr>
             <a:picLocks noChangeAspect="1"/>
@@ -3095,10 +3267,17 @@
   <p:clrMapOvr>
     <a:masterClrMapping/>
   </p:clrMapOvr>
+  <p:timing>
+    <p:tnLst>
+      <p:par>
+        <p:cTn id="1" dur="indefinite" restart="never" nodeType="tmRoot"/>
+      </p:par>
+    </p:tnLst>
+  </p:timing>
 </p:sld>
 </file>
 
-<file path=ppt/slides/slide11.xml><?xml version="1.0" encoding="utf-8"?>
+<file path=ppt/slides/slide13.xml><?xml version="1.0" encoding="utf-8"?>
 <p:sld xmlns:a="http://schemas.openxmlformats.org/drawingml/2006/main" xmlns:r="http://schemas.openxmlformats.org/officeDocument/2006/relationships" xmlns:p="http://schemas.openxmlformats.org/presentationml/2006/main">
   <p:cSld>
     <p:spTree>
@@ -3209,6 +3388,13 @@
   <p:clrMapOvr>
     <a:masterClrMapping/>
   </p:clrMapOvr>
+  <p:timing>
+    <p:tnLst>
+      <p:par>
+        <p:cTn id="1" dur="indefinite" restart="never" nodeType="tmRoot"/>
+      </p:par>
+    </p:tnLst>
+  </p:timing>
 </p:sld>
 </file>
 
@@ -3642,21 +3828,21 @@
             <a:pPr lvl="1"/>
             <a:r>
               <a:rPr lang="en-US" dirty="0" smtClean="0"/>
-              <a:t>Add back in sex-specific data</a:t>
+              <a:t>3. Add back in sex-specific data</a:t>
             </a:r>
           </a:p>
           <a:p>
             <a:pPr lvl="1"/>
             <a:r>
               <a:rPr lang="en-US" dirty="0" smtClean="0"/>
-              <a:t>Use likelihood profile to explore dropping/down-weighting size comp or CPUE indices</a:t>
+              <a:t>2. Use likelihood profile to explore dropping/down-weighting size comp or CPUE indices</a:t>
             </a:r>
           </a:p>
           <a:p>
             <a:pPr lvl="1"/>
             <a:r>
               <a:rPr lang="en-US" dirty="0" smtClean="0"/>
-              <a:t>Adding a few blocks to improve fit to size comp</a:t>
+              <a:t>1. Adding a few blocks to improve fit to size comp</a:t>
             </a:r>
           </a:p>
           <a:p>
@@ -3699,6 +3885,13 @@
   <p:clrMapOvr>
     <a:masterClrMapping/>
   </p:clrMapOvr>
+  <p:timing>
+    <p:tnLst>
+      <p:par>
+        <p:cTn id="1" dur="indefinite" restart="never" nodeType="tmRoot"/>
+      </p:par>
+    </p:tnLst>
+  </p:timing>
 </p:sld>
 </file>
 
@@ -4198,10 +4391,84 @@
   <p:clrMapOvr>
     <a:masterClrMapping/>
   </p:clrMapOvr>
+  <p:timing>
+    <p:tnLst>
+      <p:par>
+        <p:cTn id="1" dur="indefinite" restart="never" nodeType="tmRoot"/>
+      </p:par>
+    </p:tnLst>
+  </p:timing>
 </p:sld>
 </file>
 
 <file path=ppt/slides/slide6.xml><?xml version="1.0" encoding="utf-8"?>
+<p:sld xmlns:a="http://schemas.openxmlformats.org/drawingml/2006/main" xmlns:r="http://schemas.openxmlformats.org/officeDocument/2006/relationships" xmlns:p="http://schemas.openxmlformats.org/presentationml/2006/main">
+  <p:cSld>
+    <p:spTree>
+      <p:nvGrpSpPr>
+        <p:cNvPr id="1" name=""/>
+        <p:cNvGrpSpPr/>
+        <p:nvPr/>
+      </p:nvGrpSpPr>
+      <p:grpSpPr>
+        <a:xfrm>
+          <a:off x="0" y="0"/>
+          <a:ext cx="0" cy="0"/>
+          <a:chOff x="0" y="0"/>
+          <a:chExt cx="0" cy="0"/>
+        </a:xfrm>
+      </p:grpSpPr>
+      <p:pic>
+        <p:nvPicPr>
+          <p:cNvPr id="2" name="Picture 1"/>
+          <p:cNvPicPr>
+            <a:picLocks noChangeAspect="1"/>
+          </p:cNvPicPr>
+          <p:nvPr/>
+        </p:nvPicPr>
+        <p:blipFill>
+          <a:blip r:embed="rId2">
+            <a:extLst>
+              <a:ext uri="{28A0092B-C50C-407E-A947-70E740481C1C}">
+                <a14:useLocalDpi xmlns:a14="http://schemas.microsoft.com/office/drawing/2010/main" val="0"/>
+              </a:ext>
+            </a:extLst>
+          </a:blip>
+          <a:stretch>
+            <a:fillRect/>
+          </a:stretch>
+        </p:blipFill>
+        <p:spPr>
+          <a:xfrm>
+            <a:off x="2282651" y="0"/>
+            <a:ext cx="7626698" cy="6858000"/>
+          </a:xfrm>
+          <a:prstGeom prst="rect">
+            <a:avLst/>
+          </a:prstGeom>
+        </p:spPr>
+      </p:pic>
+    </p:spTree>
+    <p:extLst>
+      <p:ext uri="{BB962C8B-B14F-4D97-AF65-F5344CB8AC3E}">
+        <p14:creationId xmlns:p14="http://schemas.microsoft.com/office/powerpoint/2010/main" val="1545579635"/>
+      </p:ext>
+    </p:extLst>
+  </p:cSld>
+  <p:clrMapOvr>
+    <a:masterClrMapping/>
+  </p:clrMapOvr>
+  <p:timing>
+    <p:tnLst>
+      <p:par>
+        <p:cTn id="1" dur="indefinite" restart="never" nodeType="tmRoot"/>
+      </p:par>
+    </p:tnLst>
+  </p:timing>
+</p:sld>
+</file>
+
+<file path=ppt/slides/slide7.xml><?xml version="1.0" encoding="utf-8"?>
 <p:sld xmlns:a="http://schemas.openxmlformats.org/drawingml/2006/main" xmlns:r="http://schemas.openxmlformats.org/officeDocument/2006/relationships" xmlns:p="http://schemas.openxmlformats.org/presentationml/2006/main">
   <p:cSld>
     <p:spTree>
@@ -4258,10 +4525,17 @@
   <p:clrMapOvr>
     <a:masterClrMapping/>
   </p:clrMapOvr>
+  <p:timing>
+    <p:tnLst>
+      <p:par>
+        <p:cTn id="1" dur="indefinite" restart="never" nodeType="tmRoot"/>
+      </p:par>
+    </p:tnLst>
+  </p:timing>
 </p:sld>
 </file>
 
-<file path=ppt/slides/slide7.xml><?xml version="1.0" encoding="utf-8"?>
+<file path=ppt/slides/slide8.xml><?xml version="1.0" encoding="utf-8"?>
 <p:sld xmlns:a="http://schemas.openxmlformats.org/drawingml/2006/main" xmlns:r="http://schemas.openxmlformats.org/officeDocument/2006/relationships" xmlns:p="http://schemas.openxmlformats.org/presentationml/2006/main">
   <p:cSld>
     <p:spTree>
@@ -4348,10 +4622,17 @@
   <p:clrMapOvr>
     <a:masterClrMapping/>
   </p:clrMapOvr>
+  <p:timing>
+    <p:tnLst>
+      <p:par>
+        <p:cTn id="1" dur="indefinite" restart="never" nodeType="tmRoot"/>
+      </p:par>
+    </p:tnLst>
+  </p:timing>
 </p:sld>
 </file>
 
-<file path=ppt/slides/slide8.xml><?xml version="1.0" encoding="utf-8"?>
+<file path=ppt/slides/slide9.xml><?xml version="1.0" encoding="utf-8"?>
 <p:sld xmlns:a="http://schemas.openxmlformats.org/drawingml/2006/main" xmlns:r="http://schemas.openxmlformats.org/officeDocument/2006/relationships" xmlns:p="http://schemas.openxmlformats.org/presentationml/2006/main">
   <p:cSld>
     <p:spTree>
@@ -4618,102 +4899,13 @@
   <p:clrMapOvr>
     <a:masterClrMapping/>
   </p:clrMapOvr>
-</p:sld>
-</file>
-
-<file path=ppt/slides/slide9.xml><?xml version="1.0" encoding="utf-8"?>
-<p:sld xmlns:a="http://schemas.openxmlformats.org/drawingml/2006/main" xmlns:r="http://schemas.openxmlformats.org/officeDocument/2006/relationships" xmlns:p="http://schemas.openxmlformats.org/presentationml/2006/main">
-  <p:cSld>
-    <p:spTree>
-      <p:nvGrpSpPr>
-        <p:cNvPr id="1" name=""/>
-        <p:cNvGrpSpPr/>
-        <p:nvPr/>
-      </p:nvGrpSpPr>
-      <p:grpSpPr>
-        <a:xfrm>
-          <a:off x="0" y="0"/>
-          <a:ext cx="0" cy="0"/>
-          <a:chOff x="0" y="0"/>
-          <a:chExt cx="0" cy="0"/>
-        </a:xfrm>
-      </p:grpSpPr>
-      <p:pic>
-        <p:nvPicPr>
-          <p:cNvPr id="7" name="Picture 6"/>
-          <p:cNvPicPr>
-            <a:picLocks noChangeAspect="1"/>
-          </p:cNvPicPr>
-          <p:nvPr/>
-        </p:nvPicPr>
-        <p:blipFill>
-          <a:blip r:embed="rId2"/>
-          <a:stretch>
-            <a:fillRect/>
-          </a:stretch>
-        </p:blipFill>
-        <p:spPr>
-          <a:xfrm>
-            <a:off x="204749" y="132541"/>
-            <a:ext cx="11512412" cy="5052513"/>
-          </a:xfrm>
-          <a:prstGeom prst="rect">
-            <a:avLst/>
-          </a:prstGeom>
-        </p:spPr>
-      </p:pic>
-      <p:sp>
-        <p:nvSpPr>
-          <p:cNvPr id="8" name="TextBox 7"/>
-          <p:cNvSpPr txBox="1"/>
-          <p:nvPr/>
-        </p:nvSpPr>
-        <p:spPr>
-          <a:xfrm>
-            <a:off x="1030778" y="5436524"/>
-            <a:ext cx="3258589" cy="923330"/>
-          </a:xfrm>
-          <a:prstGeom prst="rect">
-            <a:avLst/>
-          </a:prstGeom>
-          <a:noFill/>
-        </p:spPr>
-        <p:txBody>
-          <a:bodyPr wrap="square" rtlCol="0">
-            <a:spAutoFit/>
-          </a:bodyPr>
-          <a:lstStyle/>
-          <a:p>
-            <a:r>
-              <a:rPr lang="en-US" dirty="0" smtClean="0"/>
-              <a:t>CPUE min: 6.8</a:t>
-            </a:r>
-          </a:p>
-          <a:p>
-            <a:r>
-              <a:rPr lang="en-US" dirty="0" smtClean="0"/>
-              <a:t>Size comp min: 7.4</a:t>
-            </a:r>
-          </a:p>
-          <a:p>
-            <a:r>
-              <a:rPr lang="en-US" dirty="0" smtClean="0"/>
-              <a:t>Rec min: 7.0</a:t>
-            </a:r>
-            <a:endParaRPr lang="en-US" dirty="0"/>
-          </a:p>
-        </p:txBody>
-      </p:sp>
-    </p:spTree>
-    <p:extLst>
-      <p:ext uri="{BB962C8B-B14F-4D97-AF65-F5344CB8AC3E}">
-        <p14:creationId xmlns:p14="http://schemas.microsoft.com/office/powerpoint/2010/main" val="2870394501"/>
-      </p:ext>
-    </p:extLst>
-  </p:cSld>
-  <p:clrMapOvr>
-    <a:masterClrMapping/>
-  </p:clrMapOvr>
+  <p:timing>
+    <p:tnLst>
+      <p:par>
+        <p:cTn id="1" dur="indefinite" restart="never" nodeType="tmRoot"/>
+      </p:par>
+    </p:tnLst>
+  </p:timing>
 </p:sld>
 </file>
 

</xml_diff>

<commit_message>
End of Assessment WKSHP
</commit_message>
<xml_diff>
--- a/2023 North Pacific SWO assessment.pptx
+++ b/2023 North Pacific SWO assessment.pptx
@@ -273,7 +273,7 @@
           <a:p>
             <a:fld id="{D3DF7DFC-9043-414D-BAE4-905631BA1009}" type="datetimeFigureOut">
               <a:rPr lang="en-US" smtClean="0"/>
-              <a:t>3/14/2023</a:t>
+              <a:t>4/17/2023</a:t>
             </a:fld>
             <a:endParaRPr lang="en-US"/>
           </a:p>
@@ -443,7 +443,7 @@
           <a:p>
             <a:fld id="{D3DF7DFC-9043-414D-BAE4-905631BA1009}" type="datetimeFigureOut">
               <a:rPr lang="en-US" smtClean="0"/>
-              <a:t>3/14/2023</a:t>
+              <a:t>4/17/2023</a:t>
             </a:fld>
             <a:endParaRPr lang="en-US"/>
           </a:p>
@@ -623,7 +623,7 @@
           <a:p>
             <a:fld id="{D3DF7DFC-9043-414D-BAE4-905631BA1009}" type="datetimeFigureOut">
               <a:rPr lang="en-US" smtClean="0"/>
-              <a:t>3/14/2023</a:t>
+              <a:t>4/17/2023</a:t>
             </a:fld>
             <a:endParaRPr lang="en-US"/>
           </a:p>
@@ -793,7 +793,7 @@
           <a:p>
             <a:fld id="{D3DF7DFC-9043-414D-BAE4-905631BA1009}" type="datetimeFigureOut">
               <a:rPr lang="en-US" smtClean="0"/>
-              <a:t>3/14/2023</a:t>
+              <a:t>4/17/2023</a:t>
             </a:fld>
             <a:endParaRPr lang="en-US"/>
           </a:p>
@@ -1039,7 +1039,7 @@
           <a:p>
             <a:fld id="{D3DF7DFC-9043-414D-BAE4-905631BA1009}" type="datetimeFigureOut">
               <a:rPr lang="en-US" smtClean="0"/>
-              <a:t>3/14/2023</a:t>
+              <a:t>4/17/2023</a:t>
             </a:fld>
             <a:endParaRPr lang="en-US"/>
           </a:p>
@@ -1271,7 +1271,7 @@
           <a:p>
             <a:fld id="{D3DF7DFC-9043-414D-BAE4-905631BA1009}" type="datetimeFigureOut">
               <a:rPr lang="en-US" smtClean="0"/>
-              <a:t>3/14/2023</a:t>
+              <a:t>4/17/2023</a:t>
             </a:fld>
             <a:endParaRPr lang="en-US"/>
           </a:p>
@@ -1638,7 +1638,7 @@
           <a:p>
             <a:fld id="{D3DF7DFC-9043-414D-BAE4-905631BA1009}" type="datetimeFigureOut">
               <a:rPr lang="en-US" smtClean="0"/>
-              <a:t>3/14/2023</a:t>
+              <a:t>4/17/2023</a:t>
             </a:fld>
             <a:endParaRPr lang="en-US"/>
           </a:p>
@@ -1756,7 +1756,7 @@
           <a:p>
             <a:fld id="{D3DF7DFC-9043-414D-BAE4-905631BA1009}" type="datetimeFigureOut">
               <a:rPr lang="en-US" smtClean="0"/>
-              <a:t>3/14/2023</a:t>
+              <a:t>4/17/2023</a:t>
             </a:fld>
             <a:endParaRPr lang="en-US"/>
           </a:p>
@@ -1851,7 +1851,7 @@
           <a:p>
             <a:fld id="{D3DF7DFC-9043-414D-BAE4-905631BA1009}" type="datetimeFigureOut">
               <a:rPr lang="en-US" smtClean="0"/>
-              <a:t>3/14/2023</a:t>
+              <a:t>4/17/2023</a:t>
             </a:fld>
             <a:endParaRPr lang="en-US"/>
           </a:p>
@@ -2128,7 +2128,7 @@
           <a:p>
             <a:fld id="{D3DF7DFC-9043-414D-BAE4-905631BA1009}" type="datetimeFigureOut">
               <a:rPr lang="en-US" smtClean="0"/>
-              <a:t>3/14/2023</a:t>
+              <a:t>4/17/2023</a:t>
             </a:fld>
             <a:endParaRPr lang="en-US"/>
           </a:p>
@@ -2381,7 +2381,7 @@
           <a:p>
             <a:fld id="{D3DF7DFC-9043-414D-BAE4-905631BA1009}" type="datetimeFigureOut">
               <a:rPr lang="en-US" smtClean="0"/>
-              <a:t>3/14/2023</a:t>
+              <a:t>4/17/2023</a:t>
             </a:fld>
             <a:endParaRPr lang="en-US"/>
           </a:p>
@@ -2594,7 +2594,7 @@
           <a:p>
             <a:fld id="{D3DF7DFC-9043-414D-BAE4-905631BA1009}" type="datetimeFigureOut">
               <a:rPr lang="en-US" smtClean="0"/>
-              <a:t>3/14/2023</a:t>
+              <a:t>4/17/2023</a:t>
             </a:fld>
             <a:endParaRPr lang="en-US"/>
           </a:p>
@@ -3490,7 +3490,6 @@
               <a:rPr lang="en-US" dirty="0" smtClean="0"/>
               <a:t>Tried block on HI LL Deep F9, didn’t improve fit. </a:t>
             </a:r>
-            <a:endParaRPr lang="en-US" dirty="0" smtClean="0"/>
           </a:p>
           <a:p>
             <a:r>
@@ -3499,11 +3498,7 @@
             </a:r>
             <a:r>
               <a:rPr lang="en-US" dirty="0" smtClean="0"/>
-              <a:t> </a:t>
-            </a:r>
-            <a:r>
-              <a:rPr lang="en-US" dirty="0" smtClean="0"/>
-              <a:t>all size comp lambda to 0.5</a:t>
+              <a:t> all size comp lambda to 0.5</a:t>
             </a:r>
           </a:p>
           <a:p>
@@ -3516,11 +3511,7 @@
           <a:p>
             <a:r>
               <a:rPr lang="en-US" dirty="0" smtClean="0"/>
-              <a:t> Dropped IATTC size comp prior to </a:t>
-            </a:r>
-            <a:r>
-              <a:rPr lang="en-US" dirty="0" smtClean="0"/>
-              <a:t>2001 (9 quarters, 1981-1989)</a:t>
+              <a:t> Dropped IATTC size comp prior to 2001 (9 quarters, 1981-1989)</a:t>
             </a:r>
             <a:endParaRPr lang="en-US" dirty="0"/>
           </a:p>
@@ -22334,15 +22325,7 @@
             <a:pPr lvl="1"/>
             <a:r>
               <a:rPr lang="en-US" dirty="0" smtClean="0"/>
-              <a:t>Dropped JPN </a:t>
-            </a:r>
-            <a:r>
-              <a:rPr lang="en-US" dirty="0" smtClean="0"/>
-              <a:t>IATTC </a:t>
-            </a:r>
-            <a:r>
-              <a:rPr lang="en-US" dirty="0" smtClean="0"/>
-              <a:t>size data</a:t>
+              <a:t>Dropped JPN IATTC size data</a:t>
             </a:r>
           </a:p>
           <a:p>

</xml_diff>